<commit_message>
results from today's EH team meeting
</commit_message>
<xml_diff>
--- a/etc/ap242/EH_XML_Examples/Segment Models DJG.pptx
+++ b/etc/ap242/EH_XML_Examples/Segment Models DJG.pptx
@@ -303,7 +303,7 @@
           <a:p>
             <a:fld id="{F0861BCE-9784-C64C-A2B8-9F2EED9C9312}" type="datetimeFigureOut">
               <a:rPr lang="en-US" smtClean="0"/>
-              <a:t>12/3/2015</a:t>
+              <a:t>12/14/2015</a:t>
             </a:fld>
             <a:endParaRPr lang="en-US"/>
           </a:p>
@@ -473,7 +473,7 @@
           <a:p>
             <a:fld id="{F0861BCE-9784-C64C-A2B8-9F2EED9C9312}" type="datetimeFigureOut">
               <a:rPr lang="en-US" smtClean="0"/>
-              <a:t>12/3/2015</a:t>
+              <a:t>12/14/2015</a:t>
             </a:fld>
             <a:endParaRPr lang="en-US"/>
           </a:p>
@@ -653,7 +653,7 @@
           <a:p>
             <a:fld id="{F0861BCE-9784-C64C-A2B8-9F2EED9C9312}" type="datetimeFigureOut">
               <a:rPr lang="en-US" smtClean="0"/>
-              <a:t>12/3/2015</a:t>
+              <a:t>12/14/2015</a:t>
             </a:fld>
             <a:endParaRPr lang="en-US"/>
           </a:p>
@@ -823,7 +823,7 @@
           <a:p>
             <a:fld id="{F0861BCE-9784-C64C-A2B8-9F2EED9C9312}" type="datetimeFigureOut">
               <a:rPr lang="en-US" smtClean="0"/>
-              <a:t>12/3/2015</a:t>
+              <a:t>12/14/2015</a:t>
             </a:fld>
             <a:endParaRPr lang="en-US"/>
           </a:p>
@@ -1069,7 +1069,7 @@
           <a:p>
             <a:fld id="{F0861BCE-9784-C64C-A2B8-9F2EED9C9312}" type="datetimeFigureOut">
               <a:rPr lang="en-US" smtClean="0"/>
-              <a:t>12/3/2015</a:t>
+              <a:t>12/14/2015</a:t>
             </a:fld>
             <a:endParaRPr lang="en-US"/>
           </a:p>
@@ -1357,7 +1357,7 @@
           <a:p>
             <a:fld id="{F0861BCE-9784-C64C-A2B8-9F2EED9C9312}" type="datetimeFigureOut">
               <a:rPr lang="en-US" smtClean="0"/>
-              <a:t>12/3/2015</a:t>
+              <a:t>12/14/2015</a:t>
             </a:fld>
             <a:endParaRPr lang="en-US"/>
           </a:p>
@@ -1779,7 +1779,7 @@
           <a:p>
             <a:fld id="{F0861BCE-9784-C64C-A2B8-9F2EED9C9312}" type="datetimeFigureOut">
               <a:rPr lang="en-US" smtClean="0"/>
-              <a:t>12/3/2015</a:t>
+              <a:t>12/14/2015</a:t>
             </a:fld>
             <a:endParaRPr lang="en-US"/>
           </a:p>
@@ -1897,7 +1897,7 @@
           <a:p>
             <a:fld id="{F0861BCE-9784-C64C-A2B8-9F2EED9C9312}" type="datetimeFigureOut">
               <a:rPr lang="en-US" smtClean="0"/>
-              <a:t>12/3/2015</a:t>
+              <a:t>12/14/2015</a:t>
             </a:fld>
             <a:endParaRPr lang="en-US"/>
           </a:p>
@@ -1992,7 +1992,7 @@
           <a:p>
             <a:fld id="{F0861BCE-9784-C64C-A2B8-9F2EED9C9312}" type="datetimeFigureOut">
               <a:rPr lang="en-US" smtClean="0"/>
-              <a:t>12/3/2015</a:t>
+              <a:t>12/14/2015</a:t>
             </a:fld>
             <a:endParaRPr lang="en-US"/>
           </a:p>
@@ -2269,7 +2269,7 @@
           <a:p>
             <a:fld id="{F0861BCE-9784-C64C-A2B8-9F2EED9C9312}" type="datetimeFigureOut">
               <a:rPr lang="en-US" smtClean="0"/>
-              <a:t>12/3/2015</a:t>
+              <a:t>12/14/2015</a:t>
             </a:fld>
             <a:endParaRPr lang="en-US"/>
           </a:p>
@@ -2522,7 +2522,7 @@
           <a:p>
             <a:fld id="{F0861BCE-9784-C64C-A2B8-9F2EED9C9312}" type="datetimeFigureOut">
               <a:rPr lang="en-US" smtClean="0"/>
-              <a:t>12/3/2015</a:t>
+              <a:t>12/14/2015</a:t>
             </a:fld>
             <a:endParaRPr lang="en-US"/>
           </a:p>
@@ -2735,7 +2735,7 @@
           <a:p>
             <a:fld id="{F0861BCE-9784-C64C-A2B8-9F2EED9C9312}" type="datetimeFigureOut">
               <a:rPr lang="en-US" smtClean="0"/>
-              <a:t>12/3/2015</a:t>
+              <a:t>12/14/2015</a:t>
             </a:fld>
             <a:endParaRPr lang="en-US"/>
           </a:p>
@@ -11650,8 +11650,8 @@
         </p:nvSpPr>
         <p:spPr>
           <a:xfrm>
-            <a:off x="1619660" y="1838482"/>
-            <a:ext cx="558457" cy="303273"/>
+            <a:off x="1483360" y="1838482"/>
+            <a:ext cx="694757" cy="303273"/>
           </a:xfrm>
           <a:prstGeom prst="roundRect">
             <a:avLst/>
@@ -11683,7 +11683,7 @@
             <a:pPr algn="ctr"/>
             <a:r>
               <a:rPr lang="en-US" dirty="0" smtClean="0"/>
-              <a:t>R1</a:t>
+              <a:t>lug1</a:t>
             </a:r>
             <a:endParaRPr lang="en-US" dirty="0"/>
           </a:p>
@@ -11697,8 +11697,8 @@
         </p:nvSpPr>
         <p:spPr>
           <a:xfrm>
-            <a:off x="1619660" y="3108436"/>
-            <a:ext cx="558457" cy="303273"/>
+            <a:off x="1354156" y="3223147"/>
+            <a:ext cx="858610" cy="303273"/>
           </a:xfrm>
           <a:prstGeom prst="roundRect">
             <a:avLst/>
@@ -11730,7 +11730,7 @@
             <a:pPr algn="ctr"/>
             <a:r>
               <a:rPr lang="en-US" dirty="0" smtClean="0"/>
-              <a:t>R2</a:t>
+              <a:t>arinc1</a:t>
             </a:r>
             <a:endParaRPr lang="en-US" dirty="0"/>
           </a:p>
@@ -11745,7 +11745,7 @@
         <p:spPr>
           <a:xfrm>
             <a:off x="6586937" y="3108436"/>
-            <a:ext cx="558457" cy="303273"/>
+            <a:ext cx="850183" cy="303273"/>
           </a:xfrm>
           <a:prstGeom prst="roundRect">
             <a:avLst/>
@@ -11777,7 +11777,7 @@
             <a:pPr algn="ctr"/>
             <a:r>
               <a:rPr lang="en-US" dirty="0" smtClean="0"/>
-              <a:t>R6</a:t>
+              <a:t>dsub1</a:t>
             </a:r>
             <a:endParaRPr lang="en-US" dirty="0"/>
           </a:p>
@@ -11792,7 +11792,7 @@
         <p:spPr>
           <a:xfrm>
             <a:off x="6586937" y="1838482"/>
-            <a:ext cx="558457" cy="303273"/>
+            <a:ext cx="931463" cy="303273"/>
           </a:xfrm>
           <a:prstGeom prst="roundRect">
             <a:avLst/>
@@ -11824,7 +11824,7 @@
             <a:pPr algn="ctr"/>
             <a:r>
               <a:rPr lang="en-US" dirty="0" smtClean="0"/>
-              <a:t>R5</a:t>
+              <a:t>phone1</a:t>
             </a:r>
             <a:endParaRPr lang="en-US" dirty="0"/>
           </a:p>
@@ -12925,7 +12925,7 @@
         <p:spPr>
           <a:xfrm>
             <a:off x="1690128" y="3600514"/>
-            <a:ext cx="5970777" cy="2677656"/>
+            <a:ext cx="5970777" cy="2862322"/>
           </a:xfrm>
           <a:prstGeom prst="rect">
             <a:avLst/>
@@ -12945,7 +12945,15 @@
           <a:p>
             <a:r>
               <a:rPr lang="en-US" sz="1200" dirty="0"/>
-              <a:t>Wire list (simplified)</a:t>
+              <a:t>Wire </a:t>
+            </a:r>
+            <a:r>
+              <a:rPr lang="en-US" sz="1200" dirty="0" smtClean="0"/>
+              <a:t>list 1  </a:t>
+            </a:r>
+            <a:r>
+              <a:rPr lang="en-US" sz="1200" dirty="0"/>
+              <a:t>(simplified)</a:t>
             </a:r>
           </a:p>
           <a:p>
@@ -12956,69 +12964,134 @@
           </a:p>
           <a:p>
             <a:r>
+              <a:rPr lang="en-US" sz="1200" dirty="0" smtClean="0"/>
+              <a:t>W1,2 Coax R2 </a:t>
+            </a:r>
+            <a:r>
               <a:rPr lang="en-US" sz="1200" dirty="0"/>
-              <a:t>W1	R1 – R5</a:t>
-            </a:r>
-          </a:p>
-          <a:p>
+              <a:t>– </a:t>
+            </a:r>
+            <a:r>
+              <a:rPr lang="en-US" sz="1200" dirty="0" smtClean="0"/>
+              <a:t>R6</a:t>
+            </a:r>
+            <a:endParaRPr lang="en-US" sz="1200" dirty="0"/>
+          </a:p>
+          <a:p>
+            <a:r>
+              <a:rPr lang="en-US" sz="1200" dirty="0" smtClean="0"/>
+              <a:t>W3,4 Coax R2 </a:t>
+            </a:r>
             <a:r>
               <a:rPr lang="en-US" sz="1200" dirty="0"/>
-              <a:t>W2	R1 – R6</a:t>
-            </a:r>
-          </a:p>
-          <a:p>
+              <a:t>– R6</a:t>
+            </a:r>
+          </a:p>
+          <a:p>
+            <a:r>
+              <a:rPr lang="en-US" sz="1200" dirty="0" smtClean="0"/>
+              <a:t>W5 Single R2 </a:t>
+            </a:r>
             <a:r>
               <a:rPr lang="en-US" sz="1200" dirty="0"/>
-              <a:t>W3	R2 – R6</a:t>
-            </a:r>
-          </a:p>
-          <a:p>
+              <a:t>– </a:t>
+            </a:r>
+            <a:r>
+              <a:rPr lang="en-US" sz="1200" dirty="0" smtClean="0"/>
+              <a:t>R6, splice at N3</a:t>
+            </a:r>
+            <a:endParaRPr lang="en-US" sz="1200" dirty="0"/>
+          </a:p>
+          <a:p>
+            <a:r>
+              <a:rPr lang="en-US" sz="1200" dirty="0" smtClean="0"/>
+              <a:t>W6 Shield R2 </a:t>
+            </a:r>
             <a:r>
               <a:rPr lang="en-US" sz="1200" dirty="0"/>
-              <a:t>W4	R1 – R2</a:t>
-            </a:r>
-          </a:p>
-          <a:p>
+              <a:t>– </a:t>
+            </a:r>
+            <a:r>
+              <a:rPr lang="en-US" sz="1200" dirty="0" smtClean="0"/>
+              <a:t>N4</a:t>
+            </a:r>
+          </a:p>
+          <a:p>
+            <a:r>
+              <a:rPr lang="en-US" sz="1200" dirty="0" smtClean="0"/>
+              <a:t>W7 Single N3/splice – R1</a:t>
+            </a:r>
+            <a:endParaRPr lang="en-US" sz="1200" dirty="0"/>
+          </a:p>
+          <a:p>
+            <a:r>
+              <a:rPr lang="en-US" sz="1200" dirty="0" smtClean="0"/>
+              <a:t>W8,9 </a:t>
+            </a:r>
+            <a:r>
+              <a:rPr lang="en-US" sz="1200" dirty="0" err="1" smtClean="0"/>
+              <a:t>SpeakerWire</a:t>
+            </a:r>
+            <a:r>
+              <a:rPr lang="en-US" sz="1200" dirty="0" smtClean="0"/>
+              <a:t>  R2 </a:t>
+            </a:r>
             <a:r>
               <a:rPr lang="en-US" sz="1200" dirty="0"/>
-              <a:t>W5	R1 – R6     CA1     Cable*</a:t>
-            </a:r>
-          </a:p>
-          <a:p>
-            <a:r>
-              <a:rPr lang="en-US" sz="1200" dirty="0"/>
-              <a:t>W6	R1 – R6     CA1     Cable*</a:t>
-            </a:r>
-          </a:p>
-          <a:p>
-            <a:r>
-              <a:rPr lang="en-US" sz="1200" dirty="0"/>
-              <a:t>W7	R1 – R6     CA1     Cable*</a:t>
-            </a:r>
-          </a:p>
-          <a:p>
-            <a:r>
-              <a:rPr lang="en-US" sz="1200" dirty="0"/>
-              <a:t>Shield	R1 – R6     CA1     Cable*</a:t>
-            </a:r>
-          </a:p>
-          <a:p>
+              <a:t>– </a:t>
+            </a:r>
+            <a:r>
+              <a:rPr lang="en-US" sz="1200" dirty="0" smtClean="0"/>
+              <a:t>R5     </a:t>
+            </a:r>
             <a:r>
               <a:rPr lang="en-US" sz="1200" dirty="0"/>
               <a:t> </a:t>
             </a:r>
           </a:p>
           <a:p>
-            <a:r>
-              <a:rPr lang="en-US" sz="1200" dirty="0"/>
-              <a:t>*Cable is a cable with a plastic sheath potentially manufactured as part of this harness.</a:t>
-            </a:r>
+            <a:endParaRPr lang="en-US" sz="1200" dirty="0" smtClean="0"/>
+          </a:p>
+          <a:p>
+            <a:r>
+              <a:rPr lang="en-US" sz="1200" dirty="0" smtClean="0"/>
+              <a:t>S5 grouped by lacing</a:t>
+            </a:r>
+          </a:p>
+          <a:p>
+            <a:r>
+              <a:rPr lang="en-US" sz="1200" dirty="0" smtClean="0"/>
+              <a:t>C1 wrap covering</a:t>
+            </a:r>
+          </a:p>
+          <a:p>
+            <a:r>
+              <a:rPr lang="en-US" sz="1200" dirty="0" smtClean="0"/>
+              <a:t>C2 </a:t>
+            </a:r>
+            <a:r>
+              <a:rPr lang="en-US" sz="1200" dirty="0" err="1" smtClean="0"/>
+              <a:t>HeatShrink</a:t>
+            </a:r>
+            <a:r>
+              <a:rPr lang="en-US" sz="1200" dirty="0" smtClean="0"/>
+              <a:t> covering</a:t>
+            </a:r>
+            <a:endParaRPr lang="en-US" sz="1200" dirty="0"/>
+          </a:p>
+          <a:p>
+            <a:endParaRPr lang="en-US" sz="1200" dirty="0"/>
           </a:p>
           <a:p>
             <a:r>
               <a:rPr lang="en-US" sz="1200" dirty="0"/>
               <a:t> </a:t>
             </a:r>
+            <a:r>
+              <a:rPr lang="en-US" sz="1200" dirty="0" smtClean="0"/>
+              <a:t>X6 and X7 for fixings</a:t>
+            </a:r>
+            <a:endParaRPr lang="en-US" sz="1200" dirty="0"/>
           </a:p>
         </p:txBody>
       </p:sp>
@@ -13611,8 +13684,8 @@
         </p:nvSpPr>
         <p:spPr>
           <a:xfrm>
-            <a:off x="68579" y="1838482"/>
-            <a:ext cx="1532126" cy="415498"/>
+            <a:off x="588093" y="2736594"/>
+            <a:ext cx="1532126" cy="577081"/>
           </a:xfrm>
           <a:prstGeom prst="rect">
             <a:avLst/>
@@ -13651,12 +13724,18 @@
             </a:r>
             <a:r>
               <a:rPr lang="fr-FR" sz="1050" dirty="0" err="1" smtClean="0"/>
-              <a:t>without</a:t>
+              <a:t>with</a:t>
             </a:r>
             <a:r>
               <a:rPr lang="fr-FR" sz="1050" dirty="0" smtClean="0"/>
               <a:t> EMI</a:t>
             </a:r>
+          </a:p>
+          <a:p>
+            <a:r>
+              <a:rPr lang="fr-FR" sz="1050" dirty="0" smtClean="0"/>
+              <a:t>(ARINC600)</a:t>
+            </a:r>
             <a:endParaRPr lang="fr-FR" sz="1050" dirty="0"/>
           </a:p>
         </p:txBody>
@@ -13669,7 +13748,7 @@
         </p:nvSpPr>
         <p:spPr>
           <a:xfrm>
-            <a:off x="7223904" y="1826658"/>
+            <a:off x="457200" y="1820934"/>
             <a:ext cx="874001" cy="253916"/>
           </a:xfrm>
           <a:prstGeom prst="rect">
@@ -13703,7 +13782,7 @@
         </p:nvSpPr>
         <p:spPr>
           <a:xfrm>
-            <a:off x="7331842" y="3120868"/>
+            <a:off x="7437120" y="3120868"/>
             <a:ext cx="1088258" cy="253916"/>
           </a:xfrm>
           <a:prstGeom prst="rect">
@@ -13718,16 +13797,8 @@
           <a:lstStyle/>
           <a:p>
             <a:r>
-              <a:rPr lang="fr-FR" sz="1050" dirty="0" err="1" smtClean="0"/>
-              <a:t>Triax</a:t>
-            </a:r>
-            <a:r>
               <a:rPr lang="fr-FR" sz="1050" dirty="0" smtClean="0"/>
-              <a:t> </a:t>
-            </a:r>
-            <a:r>
-              <a:rPr lang="fr-FR" sz="1050" dirty="0" err="1" smtClean="0"/>
-              <a:t>connector</a:t>
+              <a:t>DSUB9</a:t>
             </a:r>
             <a:endParaRPr lang="fr-FR" sz="1050" dirty="0"/>
           </a:p>
@@ -13735,14 +13806,14 @@
       </p:sp>
       <p:sp>
         <p:nvSpPr>
-          <p:cNvPr id="59" name="ZoneTexte 58"/>
+          <p:cNvPr id="58" name="ZoneTexte 57"/>
           <p:cNvSpPr txBox="1"/>
           <p:nvPr/>
         </p:nvSpPr>
         <p:spPr>
           <a:xfrm>
-            <a:off x="68579" y="3025463"/>
-            <a:ext cx="1532126" cy="415498"/>
+            <a:off x="7660905" y="1853880"/>
+            <a:ext cx="1088258" cy="577081"/>
           </a:xfrm>
           <a:prstGeom prst="rect">
             <a:avLst/>
@@ -13756,30 +13827,194 @@
           <a:lstStyle/>
           <a:p>
             <a:r>
+              <a:rPr lang="fr-FR" sz="1050" dirty="0" smtClean="0"/>
+              <a:t>Phone </a:t>
+            </a:r>
+            <a:r>
               <a:rPr lang="fr-FR" sz="1050" dirty="0" err="1" smtClean="0"/>
-              <a:t>Connector</a:t>
+              <a:t>connector</a:t>
             </a:r>
             <a:r>
               <a:rPr lang="fr-FR" sz="1050" dirty="0" smtClean="0"/>
-              <a:t> </a:t>
-            </a:r>
-            <a:r>
-              <a:rPr lang="fr-FR" sz="1050" dirty="0" err="1" smtClean="0"/>
-              <a:t>without</a:t>
-            </a:r>
-            <a:r>
-              <a:rPr lang="fr-FR" sz="1050" dirty="0" smtClean="0"/>
-              <a:t> inserts + EMI </a:t>
-            </a:r>
-            <a:r>
-              <a:rPr lang="fr-FR" sz="1050" dirty="0" err="1" smtClean="0"/>
-              <a:t>backshell</a:t>
-            </a:r>
-            <a:r>
-              <a:rPr lang="fr-FR" sz="1050" dirty="0" smtClean="0"/>
-              <a:t> </a:t>
+              <a:t> (6,35mm)</a:t>
             </a:r>
             <a:endParaRPr lang="fr-FR" sz="1050" dirty="0"/>
+          </a:p>
+        </p:txBody>
+      </p:sp>
+      <p:pic>
+        <p:nvPicPr>
+          <p:cNvPr id="1026" name="Picture 2"/>
+          <p:cNvPicPr>
+            <a:picLocks noChangeAspect="1" noChangeArrowheads="1"/>
+          </p:cNvPicPr>
+          <p:nvPr/>
+        </p:nvPicPr>
+        <p:blipFill>
+          <a:blip r:embed="rId2">
+            <a:extLst>
+              <a:ext uri="{28A0092B-C50C-407E-A947-70E740481C1C}">
+                <a14:useLocalDpi xmlns:a14="http://schemas.microsoft.com/office/drawing/2010/main" val="0"/>
+              </a:ext>
+            </a:extLst>
+          </a:blip>
+          <a:srcRect/>
+          <a:stretch>
+            <a:fillRect/>
+          </a:stretch>
+        </p:blipFill>
+        <p:spPr bwMode="auto">
+          <a:xfrm>
+            <a:off x="7282726" y="1128351"/>
+            <a:ext cx="983157" cy="636924"/>
+          </a:xfrm>
+          <a:prstGeom prst="rect">
+            <a:avLst/>
+          </a:prstGeom>
+          <a:noFill/>
+          <a:ln>
+            <a:noFill/>
+          </a:ln>
+          <a:extLst>
+            <a:ext uri="{909E8E84-426E-40DD-AFC4-6F175D3DCCD1}">
+              <a14:hiddenFill xmlns:a14="http://schemas.microsoft.com/office/drawing/2010/main">
+                <a:solidFill>
+                  <a:schemeClr val="accent1"/>
+                </a:solidFill>
+              </a14:hiddenFill>
+            </a:ext>
+            <a:ext uri="{91240B29-F687-4F45-9708-019B960494DF}">
+              <a14:hiddenLine xmlns:a14="http://schemas.microsoft.com/office/drawing/2010/main" w="9525">
+                <a:solidFill>
+                  <a:schemeClr val="tx1"/>
+                </a:solidFill>
+                <a:miter lim="800000"/>
+                <a:headEnd/>
+                <a:tailEnd/>
+              </a14:hiddenLine>
+            </a:ext>
+          </a:extLst>
+        </p:spPr>
+      </p:pic>
+      <p:pic>
+        <p:nvPicPr>
+          <p:cNvPr id="60" name="Image 59"/>
+          <p:cNvPicPr/>
+          <p:nvPr/>
+        </p:nvPicPr>
+        <p:blipFill rotWithShape="1">
+          <a:blip r:embed="rId3"/>
+          <a:srcRect l="72436" t="17655" r="10203" b="25382"/>
+          <a:stretch/>
+        </p:blipFill>
+        <p:spPr>
+          <a:xfrm>
+            <a:off x="92250" y="2357356"/>
+            <a:ext cx="455083" cy="1610360"/>
+          </a:xfrm>
+          <a:prstGeom prst="rect">
+            <a:avLst/>
+          </a:prstGeom>
+        </p:spPr>
+      </p:pic>
+      <p:pic>
+        <p:nvPicPr>
+          <p:cNvPr id="1027" name="Picture 3"/>
+          <p:cNvPicPr>
+            <a:picLocks noChangeAspect="1" noChangeArrowheads="1"/>
+          </p:cNvPicPr>
+          <p:nvPr/>
+        </p:nvPicPr>
+        <p:blipFill>
+          <a:blip r:embed="rId4">
+            <a:extLst>
+              <a:ext uri="{28A0092B-C50C-407E-A947-70E740481C1C}">
+                <a14:useLocalDpi xmlns:a14="http://schemas.microsoft.com/office/drawing/2010/main" val="0"/>
+              </a:ext>
+            </a:extLst>
+          </a:blip>
+          <a:srcRect/>
+          <a:stretch>
+            <a:fillRect/>
+          </a:stretch>
+        </p:blipFill>
+        <p:spPr bwMode="auto">
+          <a:xfrm>
+            <a:off x="457200" y="795870"/>
+            <a:ext cx="555625" cy="868363"/>
+          </a:xfrm>
+          <a:prstGeom prst="rect">
+            <a:avLst/>
+          </a:prstGeom>
+          <a:noFill/>
+          <a:ln>
+            <a:noFill/>
+          </a:ln>
+          <a:extLst>
+            <a:ext uri="{909E8E84-426E-40DD-AFC4-6F175D3DCCD1}">
+              <a14:hiddenFill xmlns:a14="http://schemas.microsoft.com/office/drawing/2010/main">
+                <a:solidFill>
+                  <a:schemeClr val="accent1"/>
+                </a:solidFill>
+              </a14:hiddenFill>
+            </a:ext>
+            <a:ext uri="{91240B29-F687-4F45-9708-019B960494DF}">
+              <a14:hiddenLine xmlns:a14="http://schemas.microsoft.com/office/drawing/2010/main" w="9525">
+                <a:solidFill>
+                  <a:schemeClr val="tx1"/>
+                </a:solidFill>
+                <a:miter lim="800000"/>
+                <a:headEnd/>
+                <a:tailEnd/>
+              </a14:hiddenLine>
+            </a:ext>
+          </a:extLst>
+        </p:spPr>
+      </p:pic>
+      <p:sp>
+        <p:nvSpPr>
+          <p:cNvPr id="61" name="Rounded Rectangle 76"/>
+          <p:cNvSpPr/>
+          <p:nvPr/>
+        </p:nvSpPr>
+        <p:spPr>
+          <a:xfrm>
+            <a:off x="3195494" y="1906676"/>
+            <a:ext cx="931463" cy="303273"/>
+          </a:xfrm>
+          <a:prstGeom prst="roundRect">
+            <a:avLst/>
+          </a:prstGeom>
+          <a:solidFill>
+            <a:schemeClr val="bg2">
+              <a:lumMod val="50000"/>
+            </a:schemeClr>
+          </a:solidFill>
+        </p:spPr>
+        <p:style>
+          <a:lnRef idx="1">
+            <a:schemeClr val="accent1"/>
+          </a:lnRef>
+          <a:fillRef idx="3">
+            <a:schemeClr val="accent1"/>
+          </a:fillRef>
+          <a:effectRef idx="2">
+            <a:schemeClr val="accent1"/>
+          </a:effectRef>
+          <a:fontRef idx="minor">
+            <a:schemeClr val="lt1"/>
+          </a:fontRef>
+        </p:style>
+        <p:txBody>
+          <a:bodyPr rtlCol="0" anchor="ctr"/>
+          <a:lstStyle/>
+          <a:p>
+            <a:pPr algn="ctr"/>
+            <a:r>
+              <a:rPr lang="en-US" dirty="0" smtClean="0"/>
+              <a:t>splice1</a:t>
+            </a:r>
+            <a:endParaRPr lang="en-US" dirty="0"/>
           </a:p>
         </p:txBody>
       </p:sp>

</xml_diff>

<commit_message>
results from today's EH meeting, SpecifiedOccurrence now OK, new Representation containment, assembly for example now complete. TBD HarnessNodes & AssemblyJoints
</commit_message>
<xml_diff>
--- a/etc/ap242/EH_XML_Examples/Segment Models DJG.pptx
+++ b/etc/ap242/EH_XML_Examples/Segment Models DJG.pptx
@@ -303,7 +303,7 @@
           <a:p>
             <a:fld id="{F0861BCE-9784-C64C-A2B8-9F2EED9C9312}" type="datetimeFigureOut">
               <a:rPr lang="en-US" smtClean="0"/>
-              <a:t>12/14/2015</a:t>
+              <a:t>12/17/2015</a:t>
             </a:fld>
             <a:endParaRPr lang="en-US"/>
           </a:p>
@@ -473,7 +473,7 @@
           <a:p>
             <a:fld id="{F0861BCE-9784-C64C-A2B8-9F2EED9C9312}" type="datetimeFigureOut">
               <a:rPr lang="en-US" smtClean="0"/>
-              <a:t>12/14/2015</a:t>
+              <a:t>12/17/2015</a:t>
             </a:fld>
             <a:endParaRPr lang="en-US"/>
           </a:p>
@@ -653,7 +653,7 @@
           <a:p>
             <a:fld id="{F0861BCE-9784-C64C-A2B8-9F2EED9C9312}" type="datetimeFigureOut">
               <a:rPr lang="en-US" smtClean="0"/>
-              <a:t>12/14/2015</a:t>
+              <a:t>12/17/2015</a:t>
             </a:fld>
             <a:endParaRPr lang="en-US"/>
           </a:p>
@@ -823,7 +823,7 @@
           <a:p>
             <a:fld id="{F0861BCE-9784-C64C-A2B8-9F2EED9C9312}" type="datetimeFigureOut">
               <a:rPr lang="en-US" smtClean="0"/>
-              <a:t>12/14/2015</a:t>
+              <a:t>12/17/2015</a:t>
             </a:fld>
             <a:endParaRPr lang="en-US"/>
           </a:p>
@@ -1069,7 +1069,7 @@
           <a:p>
             <a:fld id="{F0861BCE-9784-C64C-A2B8-9F2EED9C9312}" type="datetimeFigureOut">
               <a:rPr lang="en-US" smtClean="0"/>
-              <a:t>12/14/2015</a:t>
+              <a:t>12/17/2015</a:t>
             </a:fld>
             <a:endParaRPr lang="en-US"/>
           </a:p>
@@ -1357,7 +1357,7 @@
           <a:p>
             <a:fld id="{F0861BCE-9784-C64C-A2B8-9F2EED9C9312}" type="datetimeFigureOut">
               <a:rPr lang="en-US" smtClean="0"/>
-              <a:t>12/14/2015</a:t>
+              <a:t>12/17/2015</a:t>
             </a:fld>
             <a:endParaRPr lang="en-US"/>
           </a:p>
@@ -1779,7 +1779,7 @@
           <a:p>
             <a:fld id="{F0861BCE-9784-C64C-A2B8-9F2EED9C9312}" type="datetimeFigureOut">
               <a:rPr lang="en-US" smtClean="0"/>
-              <a:t>12/14/2015</a:t>
+              <a:t>12/17/2015</a:t>
             </a:fld>
             <a:endParaRPr lang="en-US"/>
           </a:p>
@@ -1897,7 +1897,7 @@
           <a:p>
             <a:fld id="{F0861BCE-9784-C64C-A2B8-9F2EED9C9312}" type="datetimeFigureOut">
               <a:rPr lang="en-US" smtClean="0"/>
-              <a:t>12/14/2015</a:t>
+              <a:t>12/17/2015</a:t>
             </a:fld>
             <a:endParaRPr lang="en-US"/>
           </a:p>
@@ -1992,7 +1992,7 @@
           <a:p>
             <a:fld id="{F0861BCE-9784-C64C-A2B8-9F2EED9C9312}" type="datetimeFigureOut">
               <a:rPr lang="en-US" smtClean="0"/>
-              <a:t>12/14/2015</a:t>
+              <a:t>12/17/2015</a:t>
             </a:fld>
             <a:endParaRPr lang="en-US"/>
           </a:p>
@@ -2269,7 +2269,7 @@
           <a:p>
             <a:fld id="{F0861BCE-9784-C64C-A2B8-9F2EED9C9312}" type="datetimeFigureOut">
               <a:rPr lang="en-US" smtClean="0"/>
-              <a:t>12/14/2015</a:t>
+              <a:t>12/17/2015</a:t>
             </a:fld>
             <a:endParaRPr lang="en-US"/>
           </a:p>
@@ -2522,7 +2522,7 @@
           <a:p>
             <a:fld id="{F0861BCE-9784-C64C-A2B8-9F2EED9C9312}" type="datetimeFigureOut">
               <a:rPr lang="en-US" smtClean="0"/>
-              <a:t>12/14/2015</a:t>
+              <a:t>12/17/2015</a:t>
             </a:fld>
             <a:endParaRPr lang="en-US"/>
           </a:p>
@@ -2735,7 +2735,7 @@
           <a:p>
             <a:fld id="{F0861BCE-9784-C64C-A2B8-9F2EED9C9312}" type="datetimeFigureOut">
               <a:rPr lang="en-US" smtClean="0"/>
-              <a:t>12/14/2015</a:t>
+              <a:t>12/17/2015</a:t>
             </a:fld>
             <a:endParaRPr lang="en-US"/>
           </a:p>
@@ -11650,8 +11650,8 @@
         </p:nvSpPr>
         <p:spPr>
           <a:xfrm>
-            <a:off x="1483360" y="1838482"/>
-            <a:ext cx="694757" cy="303273"/>
+            <a:off x="1659421" y="1862827"/>
+            <a:ext cx="570230" cy="272415"/>
           </a:xfrm>
           <a:prstGeom prst="roundRect">
             <a:avLst/>
@@ -11677,15 +11677,17 @@
           </a:fontRef>
         </p:style>
         <p:txBody>
-          <a:bodyPr rtlCol="0" anchor="ctr"/>
-          <a:lstStyle/>
-          <a:p>
-            <a:pPr algn="ctr"/>
-            <a:r>
-              <a:rPr lang="en-US" dirty="0" smtClean="0"/>
+          <a:bodyPr wrap="square" lIns="0" tIns="0" rIns="0" bIns="0" rtlCol="0" anchor="ctr">
+            <a:spAutoFit/>
+          </a:bodyPr>
+          <a:lstStyle/>
+          <a:p>
+            <a:pPr algn="ctr"/>
+            <a:r>
+              <a:rPr lang="en-US" sz="1600" dirty="0" smtClean="0"/>
               <a:t>lug1</a:t>
             </a:r>
-            <a:endParaRPr lang="en-US" dirty="0"/>
+            <a:endParaRPr lang="en-US" sz="1600" dirty="0"/>
           </a:p>
         </p:txBody>
       </p:sp>
@@ -11697,8 +11699,8 @@
         </p:nvSpPr>
         <p:spPr>
           <a:xfrm>
-            <a:off x="1354156" y="3223147"/>
-            <a:ext cx="858610" cy="303273"/>
+            <a:off x="1530216" y="3233211"/>
+            <a:ext cx="699435" cy="272415"/>
           </a:xfrm>
           <a:prstGeom prst="roundRect">
             <a:avLst/>
@@ -11724,15 +11726,17 @@
           </a:fontRef>
         </p:style>
         <p:txBody>
-          <a:bodyPr rtlCol="0" anchor="ctr"/>
-          <a:lstStyle/>
-          <a:p>
-            <a:pPr algn="ctr"/>
-            <a:r>
-              <a:rPr lang="en-US" dirty="0" smtClean="0"/>
+          <a:bodyPr wrap="square" lIns="0" tIns="0" rIns="0" bIns="0" rtlCol="0" anchor="ctr">
+            <a:spAutoFit/>
+          </a:bodyPr>
+          <a:lstStyle/>
+          <a:p>
+            <a:pPr algn="ctr"/>
+            <a:r>
+              <a:rPr lang="en-US" sz="1600" dirty="0" smtClean="0"/>
               <a:t>arinc1</a:t>
             </a:r>
-            <a:endParaRPr lang="en-US" dirty="0"/>
+            <a:endParaRPr lang="en-US" sz="1600" dirty="0"/>
           </a:p>
         </p:txBody>
       </p:sp>
@@ -11744,8 +11748,8 @@
         </p:nvSpPr>
         <p:spPr>
           <a:xfrm>
-            <a:off x="6586937" y="3108436"/>
-            <a:ext cx="850183" cy="303273"/>
+            <a:off x="6644363" y="3127610"/>
+            <a:ext cx="697230" cy="272415"/>
           </a:xfrm>
           <a:prstGeom prst="roundRect">
             <a:avLst/>
@@ -11771,15 +11775,17 @@
           </a:fontRef>
         </p:style>
         <p:txBody>
-          <a:bodyPr rtlCol="0" anchor="ctr"/>
-          <a:lstStyle/>
-          <a:p>
-            <a:pPr algn="ctr"/>
-            <a:r>
-              <a:rPr lang="en-US" dirty="0" smtClean="0"/>
+          <a:bodyPr wrap="square" lIns="0" tIns="0" rIns="0" bIns="0" rtlCol="0" anchor="ctr">
+            <a:spAutoFit/>
+          </a:bodyPr>
+          <a:lstStyle/>
+          <a:p>
+            <a:pPr algn="ctr"/>
+            <a:r>
+              <a:rPr lang="en-US" sz="1600" dirty="0" smtClean="0"/>
               <a:t>dsub1</a:t>
             </a:r>
-            <a:endParaRPr lang="en-US" dirty="0"/>
+            <a:endParaRPr lang="en-US" sz="1600" dirty="0"/>
           </a:p>
         </p:txBody>
       </p:sp>
@@ -11791,8 +11797,8 @@
         </p:nvSpPr>
         <p:spPr>
           <a:xfrm>
-            <a:off x="6586937" y="1838482"/>
-            <a:ext cx="931463" cy="303273"/>
+            <a:off x="6586937" y="1853911"/>
+            <a:ext cx="812083" cy="272415"/>
           </a:xfrm>
           <a:prstGeom prst="roundRect">
             <a:avLst/>
@@ -11818,15 +11824,17 @@
           </a:fontRef>
         </p:style>
         <p:txBody>
-          <a:bodyPr rtlCol="0" anchor="ctr"/>
-          <a:lstStyle/>
-          <a:p>
-            <a:pPr algn="ctr"/>
-            <a:r>
-              <a:rPr lang="en-US" dirty="0" smtClean="0"/>
+          <a:bodyPr wrap="square" lIns="0" tIns="0" rIns="0" bIns="0" rtlCol="0" anchor="ctr">
+            <a:spAutoFit/>
+          </a:bodyPr>
+          <a:lstStyle/>
+          <a:p>
+            <a:pPr algn="ctr"/>
+            <a:r>
+              <a:rPr lang="en-US" sz="1600" dirty="0" smtClean="0"/>
               <a:t>phone1</a:t>
             </a:r>
-            <a:endParaRPr lang="en-US" dirty="0"/>
+            <a:endParaRPr lang="en-US" sz="1600" dirty="0"/>
           </a:p>
         </p:txBody>
       </p:sp>
@@ -11876,7 +11884,7 @@
         </p:nvSpPr>
         <p:spPr>
           <a:xfrm>
-            <a:off x="3377478" y="2217896"/>
+            <a:off x="3388501" y="2243501"/>
             <a:ext cx="473905" cy="369332"/>
           </a:xfrm>
           <a:prstGeom prst="rect">
@@ -12196,7 +12204,7 @@
         </p:nvSpPr>
         <p:spPr>
           <a:xfrm>
-            <a:off x="2178117" y="2863879"/>
+            <a:off x="1992698" y="2876803"/>
             <a:ext cx="473905" cy="369332"/>
           </a:xfrm>
           <a:prstGeom prst="rect">
@@ -12276,7 +12284,7 @@
         </p:nvSpPr>
         <p:spPr>
           <a:xfrm>
-            <a:off x="4686207" y="2217896"/>
+            <a:off x="4695482" y="2256694"/>
             <a:ext cx="473905" cy="369332"/>
           </a:xfrm>
           <a:prstGeom prst="rect">
@@ -12582,7 +12590,7 @@
         </p:nvSpPr>
         <p:spPr>
           <a:xfrm>
-            <a:off x="2958796" y="2520565"/>
+            <a:off x="2934620" y="3059919"/>
             <a:ext cx="473905" cy="369332"/>
           </a:xfrm>
           <a:prstGeom prst="rect">
@@ -13144,7 +13152,7 @@
         </p:nvSpPr>
         <p:spPr>
           <a:xfrm>
-            <a:off x="2624519" y="2584194"/>
+            <a:off x="2689368" y="2507918"/>
             <a:ext cx="473905" cy="338554"/>
           </a:xfrm>
           <a:prstGeom prst="rect">
@@ -13223,7 +13231,7 @@
         </p:nvSpPr>
         <p:spPr>
           <a:xfrm>
-            <a:off x="2373061" y="2736594"/>
+            <a:off x="2360232" y="2676651"/>
             <a:ext cx="473905" cy="338554"/>
           </a:xfrm>
           <a:prstGeom prst="rect">
@@ -13302,7 +13310,7 @@
         </p:nvSpPr>
         <p:spPr>
           <a:xfrm>
-            <a:off x="4137117" y="2182011"/>
+            <a:off x="4137117" y="2308315"/>
             <a:ext cx="473905" cy="338554"/>
           </a:xfrm>
           <a:prstGeom prst="rect">
@@ -13381,7 +13389,7 @@
         </p:nvSpPr>
         <p:spPr>
           <a:xfrm>
-            <a:off x="3751861" y="2220587"/>
+            <a:off x="3761714" y="2311677"/>
             <a:ext cx="473905" cy="338554"/>
           </a:xfrm>
           <a:prstGeom prst="rect">
@@ -13979,8 +13987,8 @@
         </p:nvSpPr>
         <p:spPr>
           <a:xfrm>
-            <a:off x="3195494" y="1906676"/>
-            <a:ext cx="931463" cy="303273"/>
+            <a:off x="3188019" y="1858702"/>
+            <a:ext cx="766649" cy="272415"/>
           </a:xfrm>
           <a:prstGeom prst="roundRect">
             <a:avLst/>
@@ -14006,18 +14014,601 @@
           </a:fontRef>
         </p:style>
         <p:txBody>
+          <a:bodyPr wrap="square" lIns="0" tIns="0" rIns="0" bIns="0" rtlCol="0" anchor="ctr">
+            <a:spAutoFit/>
+          </a:bodyPr>
+          <a:lstStyle/>
+          <a:p>
+            <a:pPr algn="ctr"/>
+            <a:r>
+              <a:rPr lang="en-US" sz="1600" dirty="0" smtClean="0"/>
+              <a:t>splice1</a:t>
+            </a:r>
+            <a:endParaRPr lang="en-US" sz="1600" dirty="0"/>
+          </a:p>
+        </p:txBody>
+      </p:sp>
+      <p:sp>
+        <p:nvSpPr>
+          <p:cNvPr id="62" name="TextBox 111"/>
+          <p:cNvSpPr txBox="1"/>
+          <p:nvPr/>
+        </p:nvSpPr>
+        <p:spPr>
+          <a:xfrm>
+            <a:off x="2952167" y="2572977"/>
+            <a:ext cx="473905" cy="276999"/>
+          </a:xfrm>
+          <a:prstGeom prst="rect">
+            <a:avLst/>
+          </a:prstGeom>
+          <a:noFill/>
+        </p:spPr>
+        <p:txBody>
+          <a:bodyPr wrap="square" rtlCol="0">
+            <a:spAutoFit/>
+          </a:bodyPr>
+          <a:lstStyle/>
+          <a:p>
+            <a:r>
+              <a:rPr lang="en-US" sz="1200" dirty="0" smtClean="0"/>
+              <a:t>S2-1</a:t>
+            </a:r>
+            <a:endParaRPr lang="en-US" sz="1200" dirty="0"/>
+          </a:p>
+        </p:txBody>
+      </p:sp>
+      <p:sp>
+        <p:nvSpPr>
+          <p:cNvPr id="63" name="TextBox 111"/>
+          <p:cNvSpPr txBox="1"/>
+          <p:nvPr/>
+        </p:nvSpPr>
+        <p:spPr>
+          <a:xfrm>
+            <a:off x="2568735" y="2786724"/>
+            <a:ext cx="473905" cy="276999"/>
+          </a:xfrm>
+          <a:prstGeom prst="rect">
+            <a:avLst/>
+          </a:prstGeom>
+          <a:noFill/>
+        </p:spPr>
+        <p:txBody>
+          <a:bodyPr wrap="square" rtlCol="0">
+            <a:spAutoFit/>
+          </a:bodyPr>
+          <a:lstStyle/>
+          <a:p>
+            <a:r>
+              <a:rPr lang="en-US" sz="1200" dirty="0" smtClean="0"/>
+              <a:t>S2-2</a:t>
+            </a:r>
+            <a:endParaRPr lang="en-US" sz="1200" dirty="0"/>
+          </a:p>
+        </p:txBody>
+      </p:sp>
+      <p:sp>
+        <p:nvSpPr>
+          <p:cNvPr id="64" name="TextBox 111"/>
+          <p:cNvSpPr txBox="1"/>
+          <p:nvPr/>
+        </p:nvSpPr>
+        <p:spPr>
+          <a:xfrm>
+            <a:off x="3713761" y="2057876"/>
+            <a:ext cx="473905" cy="276999"/>
+          </a:xfrm>
+          <a:prstGeom prst="rect">
+            <a:avLst/>
+          </a:prstGeom>
+          <a:noFill/>
+        </p:spPr>
+        <p:txBody>
+          <a:bodyPr wrap="square" rtlCol="0">
+            <a:spAutoFit/>
+          </a:bodyPr>
+          <a:lstStyle/>
+          <a:p>
+            <a:r>
+              <a:rPr lang="en-US" sz="1200" dirty="0" smtClean="0"/>
+              <a:t>S3-1</a:t>
+            </a:r>
+            <a:endParaRPr lang="en-US" sz="1200" dirty="0"/>
+          </a:p>
+        </p:txBody>
+      </p:sp>
+      <p:sp>
+        <p:nvSpPr>
+          <p:cNvPr id="3" name="Accolade fermante 2"/>
+          <p:cNvSpPr/>
+          <p:nvPr/>
+        </p:nvSpPr>
+        <p:spPr>
+          <a:xfrm rot="16200000">
+            <a:off x="3900793" y="1932496"/>
+            <a:ext cx="107751" cy="712250"/>
+          </a:xfrm>
+          <a:prstGeom prst="rightBrace">
+            <a:avLst/>
+          </a:prstGeom>
+          <a:ln w="9525">
+            <a:solidFill>
+              <a:schemeClr val="tx1"/>
+            </a:solidFill>
+          </a:ln>
+        </p:spPr>
+        <p:style>
+          <a:lnRef idx="2">
+            <a:schemeClr val="accent1"/>
+          </a:lnRef>
+          <a:fillRef idx="0">
+            <a:schemeClr val="accent1"/>
+          </a:fillRef>
+          <a:effectRef idx="1">
+            <a:schemeClr val="accent1"/>
+          </a:effectRef>
+          <a:fontRef idx="minor">
+            <a:schemeClr val="tx1"/>
+          </a:fontRef>
+        </p:style>
+        <p:txBody>
           <a:bodyPr rtlCol="0" anchor="ctr"/>
           <a:lstStyle/>
           <a:p>
             <a:pPr algn="ctr"/>
-            <a:r>
-              <a:rPr lang="en-US" dirty="0" smtClean="0"/>
-              <a:t>splice1</a:t>
-            </a:r>
-            <a:endParaRPr lang="en-US" dirty="0"/>
-          </a:p>
-        </p:txBody>
-      </p:sp>
+            <a:endParaRPr lang="fr-FR"/>
+          </a:p>
+        </p:txBody>
+      </p:sp>
+      <p:sp>
+        <p:nvSpPr>
+          <p:cNvPr id="66" name="Accolade fermante 65"/>
+          <p:cNvSpPr/>
+          <p:nvPr/>
+        </p:nvSpPr>
+        <p:spPr>
+          <a:xfrm rot="5400000">
+            <a:off x="4379948" y="2485093"/>
+            <a:ext cx="107750" cy="912321"/>
+          </a:xfrm>
+          <a:prstGeom prst="rightBrace">
+            <a:avLst/>
+          </a:prstGeom>
+          <a:ln w="9525">
+            <a:solidFill>
+              <a:schemeClr val="tx1"/>
+            </a:solidFill>
+          </a:ln>
+        </p:spPr>
+        <p:style>
+          <a:lnRef idx="2">
+            <a:schemeClr val="accent1"/>
+          </a:lnRef>
+          <a:fillRef idx="0">
+            <a:schemeClr val="accent1"/>
+          </a:fillRef>
+          <a:effectRef idx="1">
+            <a:schemeClr val="accent1"/>
+          </a:effectRef>
+          <a:fontRef idx="minor">
+            <a:schemeClr val="tx1"/>
+          </a:fontRef>
+        </p:style>
+        <p:txBody>
+          <a:bodyPr rtlCol="0" anchor="ctr"/>
+          <a:lstStyle/>
+          <a:p>
+            <a:pPr algn="ctr"/>
+            <a:endParaRPr lang="fr-FR"/>
+          </a:p>
+        </p:txBody>
+      </p:sp>
+      <p:sp>
+        <p:nvSpPr>
+          <p:cNvPr id="67" name="Accolade fermante 66"/>
+          <p:cNvSpPr/>
+          <p:nvPr/>
+        </p:nvSpPr>
+        <p:spPr>
+          <a:xfrm rot="5400000">
+            <a:off x="3722356" y="2788854"/>
+            <a:ext cx="108791" cy="303760"/>
+          </a:xfrm>
+          <a:prstGeom prst="rightBrace">
+            <a:avLst/>
+          </a:prstGeom>
+          <a:ln w="9525">
+            <a:solidFill>
+              <a:schemeClr val="tx1"/>
+            </a:solidFill>
+          </a:ln>
+        </p:spPr>
+        <p:style>
+          <a:lnRef idx="2">
+            <a:schemeClr val="accent1"/>
+          </a:lnRef>
+          <a:fillRef idx="0">
+            <a:schemeClr val="accent1"/>
+          </a:fillRef>
+          <a:effectRef idx="1">
+            <a:schemeClr val="accent1"/>
+          </a:effectRef>
+          <a:fontRef idx="minor">
+            <a:schemeClr val="tx1"/>
+          </a:fontRef>
+        </p:style>
+        <p:txBody>
+          <a:bodyPr rtlCol="0" anchor="ctr"/>
+          <a:lstStyle/>
+          <a:p>
+            <a:pPr algn="ctr"/>
+            <a:endParaRPr lang="fr-FR"/>
+          </a:p>
+        </p:txBody>
+      </p:sp>
+      <p:sp>
+        <p:nvSpPr>
+          <p:cNvPr id="68" name="TextBox 111"/>
+          <p:cNvSpPr txBox="1"/>
+          <p:nvPr/>
+        </p:nvSpPr>
+        <p:spPr>
+          <a:xfrm>
+            <a:off x="3540979" y="2950952"/>
+            <a:ext cx="473905" cy="276999"/>
+          </a:xfrm>
+          <a:prstGeom prst="rect">
+            <a:avLst/>
+          </a:prstGeom>
+          <a:noFill/>
+        </p:spPr>
+        <p:txBody>
+          <a:bodyPr wrap="square" rtlCol="0">
+            <a:spAutoFit/>
+          </a:bodyPr>
+          <a:lstStyle/>
+          <a:p>
+            <a:r>
+              <a:rPr lang="en-US" sz="1200" dirty="0" smtClean="0"/>
+              <a:t>S3-a</a:t>
+            </a:r>
+            <a:endParaRPr lang="en-US" sz="1200" dirty="0"/>
+          </a:p>
+        </p:txBody>
+      </p:sp>
+      <p:sp>
+        <p:nvSpPr>
+          <p:cNvPr id="69" name="TextBox 111"/>
+          <p:cNvSpPr txBox="1"/>
+          <p:nvPr/>
+        </p:nvSpPr>
+        <p:spPr>
+          <a:xfrm>
+            <a:off x="4219278" y="2952314"/>
+            <a:ext cx="473905" cy="276999"/>
+          </a:xfrm>
+          <a:prstGeom prst="rect">
+            <a:avLst/>
+          </a:prstGeom>
+          <a:noFill/>
+        </p:spPr>
+        <p:txBody>
+          <a:bodyPr wrap="square" rtlCol="0">
+            <a:spAutoFit/>
+          </a:bodyPr>
+          <a:lstStyle/>
+          <a:p>
+            <a:r>
+              <a:rPr lang="en-US" sz="1200" dirty="0" smtClean="0"/>
+              <a:t>S3-b</a:t>
+            </a:r>
+            <a:endParaRPr lang="en-US" sz="1200" dirty="0"/>
+          </a:p>
+        </p:txBody>
+      </p:sp>
+      <p:sp>
+        <p:nvSpPr>
+          <p:cNvPr id="6" name="ZoneTexte 5"/>
+          <p:cNvSpPr txBox="1"/>
+          <p:nvPr/>
+        </p:nvSpPr>
+        <p:spPr>
+          <a:xfrm>
+            <a:off x="4889984" y="3919728"/>
+            <a:ext cx="3091265" cy="1754326"/>
+          </a:xfrm>
+          <a:prstGeom prst="rect">
+            <a:avLst/>
+          </a:prstGeom>
+          <a:noFill/>
+        </p:spPr>
+        <p:txBody>
+          <a:bodyPr wrap="square" rtlCol="0">
+            <a:spAutoFit/>
+          </a:bodyPr>
+          <a:lstStyle/>
+          <a:p>
+            <a:r>
+              <a:rPr lang="fr-FR" sz="1200" dirty="0" smtClean="0"/>
+              <a:t>wire1: S2+S3+S5</a:t>
+            </a:r>
+          </a:p>
+          <a:p>
+            <a:r>
+              <a:rPr lang="fr-FR" sz="1200" dirty="0"/>
+              <a:t>w</a:t>
+            </a:r>
+            <a:r>
+              <a:rPr lang="fr-FR" sz="1200" dirty="0" smtClean="0"/>
+              <a:t>ire2: S1</a:t>
+            </a:r>
+          </a:p>
+          <a:p>
+            <a:r>
+              <a:rPr lang="fr-FR" sz="1200" dirty="0" smtClean="0"/>
+              <a:t>Cable1 (</a:t>
+            </a:r>
+            <a:r>
+              <a:rPr lang="fr-FR" sz="1200" dirty="0"/>
+              <a:t>RG </a:t>
+            </a:r>
+            <a:r>
+              <a:rPr lang="fr-FR" sz="1200" dirty="0" smtClean="0"/>
+              <a:t>58): S2+S3+S5</a:t>
+            </a:r>
+          </a:p>
+          <a:p>
+            <a:r>
+              <a:rPr lang="fr-FR" sz="1200" dirty="0" smtClean="0"/>
+              <a:t>Cable2</a:t>
+            </a:r>
+            <a:r>
+              <a:rPr lang="fr-FR" sz="1200" dirty="0"/>
+              <a:t> (RG 58): </a:t>
+            </a:r>
+            <a:r>
+              <a:rPr lang="fr-FR" sz="1200" dirty="0" smtClean="0"/>
+              <a:t>S2+S3+S5</a:t>
+            </a:r>
+          </a:p>
+          <a:p>
+            <a:r>
+              <a:rPr lang="fr-FR" sz="1200" dirty="0" smtClean="0"/>
+              <a:t>Cable3 (</a:t>
+            </a:r>
+            <a:r>
+              <a:rPr lang="fr-FR" sz="1200" dirty="0"/>
+              <a:t>Speaker </a:t>
+            </a:r>
+            <a:r>
+              <a:rPr lang="fr-FR" sz="1200" dirty="0" err="1"/>
+              <a:t>wire</a:t>
+            </a:r>
+            <a:r>
+              <a:rPr lang="fr-FR" sz="1200" dirty="0"/>
+              <a:t> </a:t>
+            </a:r>
+            <a:r>
+              <a:rPr lang="fr-FR" sz="1200" dirty="0" smtClean="0"/>
+              <a:t>): S2+S3+S4</a:t>
+            </a:r>
+          </a:p>
+          <a:p>
+            <a:r>
+              <a:rPr lang="fr-FR" sz="1200" dirty="0" smtClean="0"/>
+              <a:t>wrap1 (</a:t>
+            </a:r>
+            <a:r>
+              <a:rPr lang="fr-FR" sz="1200" dirty="0"/>
+              <a:t>protective </a:t>
+            </a:r>
+            <a:r>
+              <a:rPr lang="fr-FR" sz="1200" dirty="0" err="1" smtClean="0"/>
+              <a:t>covering</a:t>
+            </a:r>
+            <a:r>
+              <a:rPr lang="fr-FR" sz="1200" dirty="0" smtClean="0"/>
+              <a:t>): C1</a:t>
+            </a:r>
+          </a:p>
+          <a:p>
+            <a:r>
+              <a:rPr lang="fr-FR" sz="1200" dirty="0" smtClean="0"/>
+              <a:t>Heatshrink1 (</a:t>
+            </a:r>
+            <a:r>
+              <a:rPr lang="fr-FR" sz="1200" dirty="0" err="1"/>
+              <a:t>H</a:t>
+            </a:r>
+            <a:r>
+              <a:rPr lang="fr-FR" sz="1200" dirty="0" err="1" smtClean="0"/>
+              <a:t>eatshrink</a:t>
+            </a:r>
+            <a:r>
+              <a:rPr lang="fr-FR" sz="1200" dirty="0" smtClean="0"/>
+              <a:t>): C2</a:t>
+            </a:r>
+          </a:p>
+          <a:p>
+            <a:r>
+              <a:rPr lang="fr-FR" sz="1200" dirty="0" smtClean="0"/>
+              <a:t>Braid1 (</a:t>
+            </a:r>
+            <a:r>
+              <a:rPr lang="fr-FR" sz="1200" dirty="0" err="1" smtClean="0"/>
+              <a:t>braid</a:t>
+            </a:r>
+            <a:r>
+              <a:rPr lang="fr-FR" sz="1200" dirty="0" smtClean="0"/>
+              <a:t>): S2+S3</a:t>
+            </a:r>
+          </a:p>
+          <a:p>
+            <a:r>
+              <a:rPr lang="fr-FR" sz="1200" dirty="0" smtClean="0"/>
+              <a:t>[</a:t>
+            </a:r>
+            <a:r>
+              <a:rPr lang="fr-FR" sz="1200" dirty="0" err="1" smtClean="0"/>
+              <a:t>Lacing</a:t>
+            </a:r>
+            <a:r>
+              <a:rPr lang="fr-FR" sz="1200" dirty="0"/>
+              <a:t>]</a:t>
+            </a:r>
+            <a:r>
+              <a:rPr lang="fr-FR" sz="1200" dirty="0" smtClean="0"/>
+              <a:t>: S5</a:t>
+            </a:r>
+            <a:endParaRPr lang="fr-FR" sz="1200" dirty="0"/>
+          </a:p>
+        </p:txBody>
+      </p:sp>
+      <p:sp>
+        <p:nvSpPr>
+          <p:cNvPr id="73" name="TextBox 111"/>
+          <p:cNvSpPr txBox="1"/>
+          <p:nvPr/>
+        </p:nvSpPr>
+        <p:spPr>
+          <a:xfrm>
+            <a:off x="4443755" y="2046253"/>
+            <a:ext cx="473905" cy="276999"/>
+          </a:xfrm>
+          <a:prstGeom prst="rect">
+            <a:avLst/>
+          </a:prstGeom>
+          <a:noFill/>
+        </p:spPr>
+        <p:txBody>
+          <a:bodyPr wrap="square" rtlCol="0">
+            <a:spAutoFit/>
+          </a:bodyPr>
+          <a:lstStyle/>
+          <a:p>
+            <a:r>
+              <a:rPr lang="en-US" sz="1200" dirty="0" smtClean="0"/>
+              <a:t>S3-2</a:t>
+            </a:r>
+            <a:endParaRPr lang="en-US" sz="1200" dirty="0"/>
+          </a:p>
+        </p:txBody>
+      </p:sp>
+      <p:sp>
+        <p:nvSpPr>
+          <p:cNvPr id="74" name="Accolade fermante 73"/>
+          <p:cNvSpPr/>
+          <p:nvPr/>
+        </p:nvSpPr>
+        <p:spPr>
+          <a:xfrm rot="16200000">
+            <a:off x="4549574" y="2002086"/>
+            <a:ext cx="119374" cy="561446"/>
+          </a:xfrm>
+          <a:prstGeom prst="rightBrace">
+            <a:avLst/>
+          </a:prstGeom>
+          <a:ln w="9525">
+            <a:solidFill>
+              <a:schemeClr val="tx1"/>
+            </a:solidFill>
+          </a:ln>
+        </p:spPr>
+        <p:style>
+          <a:lnRef idx="2">
+            <a:schemeClr val="accent1"/>
+          </a:lnRef>
+          <a:fillRef idx="0">
+            <a:schemeClr val="accent1"/>
+          </a:fillRef>
+          <a:effectRef idx="1">
+            <a:schemeClr val="accent1"/>
+          </a:effectRef>
+          <a:fontRef idx="minor">
+            <a:schemeClr val="tx1"/>
+          </a:fontRef>
+        </p:style>
+        <p:txBody>
+          <a:bodyPr rtlCol="0" anchor="ctr"/>
+          <a:lstStyle/>
+          <a:p>
+            <a:pPr algn="ctr"/>
+            <a:endParaRPr lang="fr-FR"/>
+          </a:p>
+        </p:txBody>
+      </p:sp>
+      <p:sp>
+        <p:nvSpPr>
+          <p:cNvPr id="79" name="TextBox 111"/>
+          <p:cNvSpPr txBox="1"/>
+          <p:nvPr/>
+        </p:nvSpPr>
+        <p:spPr>
+          <a:xfrm>
+            <a:off x="2268530" y="2930220"/>
+            <a:ext cx="473905" cy="276999"/>
+          </a:xfrm>
+          <a:prstGeom prst="rect">
+            <a:avLst/>
+          </a:prstGeom>
+          <a:noFill/>
+        </p:spPr>
+        <p:txBody>
+          <a:bodyPr wrap="square" rtlCol="0">
+            <a:spAutoFit/>
+          </a:bodyPr>
+          <a:lstStyle/>
+          <a:p>
+            <a:r>
+              <a:rPr lang="en-US" sz="1200" dirty="0" smtClean="0"/>
+              <a:t>S2-3</a:t>
+            </a:r>
+            <a:endParaRPr lang="en-US" sz="1200" dirty="0"/>
+          </a:p>
+        </p:txBody>
+      </p:sp>
+      <p:pic>
+        <p:nvPicPr>
+          <p:cNvPr id="7" name="Picture 2" descr="C:\Temp\SNAGHTML68c953e.PNG"/>
+          <p:cNvPicPr>
+            <a:picLocks noChangeAspect="1" noChangeArrowheads="1"/>
+          </p:cNvPicPr>
+          <p:nvPr/>
+        </p:nvPicPr>
+        <p:blipFill>
+          <a:blip r:embed="rId5">
+            <a:extLst>
+              <a:ext uri="{28A0092B-C50C-407E-A947-70E740481C1C}">
+                <a14:useLocalDpi xmlns:a14="http://schemas.microsoft.com/office/drawing/2010/main" val="0"/>
+              </a:ext>
+            </a:extLst>
+          </a:blip>
+          <a:srcRect/>
+          <a:stretch>
+            <a:fillRect/>
+          </a:stretch>
+        </p:blipFill>
+        <p:spPr bwMode="auto">
+          <a:xfrm>
+            <a:off x="7641525" y="3429251"/>
+            <a:ext cx="883853" cy="753176"/>
+          </a:xfrm>
+          <a:prstGeom prst="rect">
+            <a:avLst/>
+          </a:prstGeom>
+          <a:noFill/>
+          <a:extLst>
+            <a:ext uri="{909E8E84-426E-40DD-AFC4-6F175D3DCCD1}">
+              <a14:hiddenFill xmlns:a14="http://schemas.microsoft.com/office/drawing/2010/main">
+                <a:solidFill>
+                  <a:srgbClr val="FFFFFF"/>
+                </a:solidFill>
+              </a14:hiddenFill>
+            </a:ext>
+          </a:extLst>
+        </p:spPr>
+      </p:pic>
     </p:spTree>
     <p:extLst>
       <p:ext uri="{BB962C8B-B14F-4D97-AF65-F5344CB8AC3E}">

</xml_diff>